<commit_message>
MaJ avant les partiel S2 de 4AL
</commit_message>
<xml_diff>
--- a/Cours Archi logiciel/elevator pitch/Nouveau Présentation Microsoft PowerPoint.pptx
+++ b/Cours Archi logiciel/elevator pitch/Nouveau Présentation Microsoft PowerPoint.pptx
@@ -15,7 +15,7 @@
     <p:sldId id="259" r:id="rId6"/>
   </p:sldIdLst>
   <p:sldSz cx="12192000" cy="6858000"/>
-  <p:notesSz cx="6858000" cy="9144000"/>
+  <p:notesSz cx="7315200" cy="9601200"/>
   <p:defaultTextStyle>
     <a:defPPr>
       <a:defRPr lang="fr-FR"/>
@@ -111,6 +111,11 @@
       </a:defRPr>
     </a:lvl9pPr>
   </p:defaultTextStyle>
+  <p:extLst>
+    <p:ext uri="{EFAFB233-063F-42B5-8137-9DF3F51BA10A}">
+      <p15:sldGuideLst xmlns:p15="http://schemas.microsoft.com/office/powerpoint/2012/main"/>
+    </p:ext>
+  </p:extLst>
 </p:presentation>
 </file>
 
@@ -149,17 +154,17 @@
         <p:spPr>
           <a:xfrm>
             <a:off x="0" y="0"/>
-            <a:ext cx="2971800" cy="458788"/>
+            <a:ext cx="3169920" cy="481727"/>
           </a:xfrm>
           <a:prstGeom prst="rect">
             <a:avLst/>
           </a:prstGeom>
         </p:spPr>
         <p:txBody>
-          <a:bodyPr vert="horz" lIns="91440" tIns="45720" rIns="91440" bIns="45720" rtlCol="0"/>
+          <a:bodyPr vert="horz" lIns="96661" tIns="48331" rIns="96661" bIns="48331" rtlCol="0"/>
           <a:lstStyle>
             <a:lvl1pPr algn="l">
-              <a:defRPr sz="1200"/>
+              <a:defRPr sz="1300"/>
             </a:lvl1pPr>
           </a:lstStyle>
           <a:p>
@@ -179,24 +184,24 @@
         </p:nvSpPr>
         <p:spPr>
           <a:xfrm>
-            <a:off x="3884613" y="0"/>
-            <a:ext cx="2971800" cy="458788"/>
+            <a:off x="4143587" y="0"/>
+            <a:ext cx="3169920" cy="481727"/>
           </a:xfrm>
           <a:prstGeom prst="rect">
             <a:avLst/>
           </a:prstGeom>
         </p:spPr>
         <p:txBody>
-          <a:bodyPr vert="horz" lIns="91440" tIns="45720" rIns="91440" bIns="45720" rtlCol="0"/>
+          <a:bodyPr vert="horz" lIns="96661" tIns="48331" rIns="96661" bIns="48331" rtlCol="0"/>
           <a:lstStyle>
             <a:lvl1pPr algn="r">
-              <a:defRPr sz="1200"/>
+              <a:defRPr sz="1300"/>
             </a:lvl1pPr>
           </a:lstStyle>
           <a:p>
             <a:fld id="{A6B52AC3-4F27-40E3-8F37-A6678BFC85D3}" type="datetimeFigureOut">
               <a:rPr lang="fr-FR" smtClean="0"/>
-              <a:t>20/06/2018</a:t>
+              <a:t>26/06/2018</a:t>
             </a:fld>
             <a:endParaRPr lang="fr-FR"/>
           </a:p>
@@ -214,8 +219,8 @@
         </p:nvSpPr>
         <p:spPr>
           <a:xfrm>
-            <a:off x="685800" y="1143000"/>
-            <a:ext cx="5486400" cy="3086100"/>
+            <a:off x="777875" y="1200150"/>
+            <a:ext cx="5759450" cy="3240088"/>
           </a:xfrm>
           <a:prstGeom prst="rect">
             <a:avLst/>
@@ -228,7 +233,7 @@
           </a:ln>
         </p:spPr>
         <p:txBody>
-          <a:bodyPr vert="horz" lIns="91440" tIns="45720" rIns="91440" bIns="45720" rtlCol="0" anchor="ctr"/>
+          <a:bodyPr vert="horz" lIns="96661" tIns="48331" rIns="96661" bIns="48331" rtlCol="0" anchor="ctr"/>
           <a:lstStyle/>
           <a:p>
             <a:endParaRPr lang="fr-FR"/>
@@ -247,15 +252,15 @@
         </p:nvSpPr>
         <p:spPr>
           <a:xfrm>
-            <a:off x="685800" y="4400550"/>
-            <a:ext cx="5486400" cy="3600450"/>
+            <a:off x="731520" y="4620577"/>
+            <a:ext cx="5852160" cy="3780473"/>
           </a:xfrm>
           <a:prstGeom prst="rect">
             <a:avLst/>
           </a:prstGeom>
         </p:spPr>
         <p:txBody>
-          <a:bodyPr vert="horz" lIns="91440" tIns="45720" rIns="91440" bIns="45720" rtlCol="0"/>
+          <a:bodyPr vert="horz" lIns="96661" tIns="48331" rIns="96661" bIns="48331" rtlCol="0"/>
           <a:lstStyle/>
           <a:p>
             <a:pPr lvl="0"/>
@@ -306,18 +311,18 @@
         </p:nvSpPr>
         <p:spPr>
           <a:xfrm>
-            <a:off x="0" y="8685213"/>
-            <a:ext cx="2971800" cy="458787"/>
+            <a:off x="0" y="9119474"/>
+            <a:ext cx="3169920" cy="481726"/>
           </a:xfrm>
           <a:prstGeom prst="rect">
             <a:avLst/>
           </a:prstGeom>
         </p:spPr>
         <p:txBody>
-          <a:bodyPr vert="horz" lIns="91440" tIns="45720" rIns="91440" bIns="45720" rtlCol="0" anchor="b"/>
+          <a:bodyPr vert="horz" lIns="96661" tIns="48331" rIns="96661" bIns="48331" rtlCol="0" anchor="b"/>
           <a:lstStyle>
             <a:lvl1pPr algn="l">
-              <a:defRPr sz="1200"/>
+              <a:defRPr sz="1300"/>
             </a:lvl1pPr>
           </a:lstStyle>
           <a:p>
@@ -337,18 +342,18 @@
         </p:nvSpPr>
         <p:spPr>
           <a:xfrm>
-            <a:off x="3884613" y="8685213"/>
-            <a:ext cx="2971800" cy="458787"/>
+            <a:off x="4143587" y="9119474"/>
+            <a:ext cx="3169920" cy="481726"/>
           </a:xfrm>
           <a:prstGeom prst="rect">
             <a:avLst/>
           </a:prstGeom>
         </p:spPr>
         <p:txBody>
-          <a:bodyPr vert="horz" lIns="91440" tIns="45720" rIns="91440" bIns="45720" rtlCol="0" anchor="b"/>
+          <a:bodyPr vert="horz" lIns="96661" tIns="48331" rIns="96661" bIns="48331" rtlCol="0" anchor="b"/>
           <a:lstStyle>
             <a:lvl1pPr algn="r">
-              <a:defRPr sz="1200"/>
+              <a:defRPr sz="1300"/>
             </a:lvl1pPr>
           </a:lstStyle>
           <a:p>
@@ -683,6 +688,101 @@
           <a:p>
             <a:r>
               <a:rPr lang="fr-FR" dirty="0"/>
+              <a:t>Margaret Hamilton prise au MIT à coté d’une version imprimé du code qu’elle a écrit pour l’ordinateur de bord de l’</a:t>
+            </a:r>
+            <a:r>
+              <a:rPr lang="fr-FR" dirty="0" err="1"/>
+              <a:t>aterrisseur</a:t>
+            </a:r>
+            <a:r>
+              <a:rPr lang="fr-FR" dirty="0"/>
+              <a:t> lunaire</a:t>
+            </a:r>
+          </a:p>
+        </p:txBody>
+      </p:sp>
+      <p:sp>
+        <p:nvSpPr>
+          <p:cNvPr id="4" name="Espace réservé du numéro de diapositive 3"/>
+          <p:cNvSpPr>
+            <a:spLocks noGrp="1"/>
+          </p:cNvSpPr>
+          <p:nvPr>
+            <p:ph type="sldNum" sz="quarter" idx="10"/>
+          </p:nvPr>
+        </p:nvSpPr>
+        <p:spPr/>
+        <p:txBody>
+          <a:bodyPr/>
+          <a:lstStyle/>
+          <a:p>
+            <a:fld id="{6D4BFCF3-FB96-45FC-A658-0E7883483BCF}" type="slidenum">
+              <a:rPr lang="fr-FR" smtClean="0"/>
+              <a:t>3</a:t>
+            </a:fld>
+            <a:endParaRPr lang="fr-FR"/>
+          </a:p>
+        </p:txBody>
+      </p:sp>
+    </p:spTree>
+    <p:extLst>
+      <p:ext uri="{BB962C8B-B14F-4D97-AF65-F5344CB8AC3E}">
+        <p14:creationId xmlns:p14="http://schemas.microsoft.com/office/powerpoint/2010/main" val="2611507741"/>
+      </p:ext>
+    </p:extLst>
+  </p:cSld>
+  <p:clrMapOvr>
+    <a:masterClrMapping/>
+  </p:clrMapOvr>
+</p:notes>
+</file>
+
+<file path=ppt/notesSlides/notesSlide4.xml><?xml version="1.0" encoding="utf-8"?>
+<p:notes xmlns:a="http://schemas.openxmlformats.org/drawingml/2006/main" xmlns:r="http://schemas.openxmlformats.org/officeDocument/2006/relationships" xmlns:p="http://schemas.openxmlformats.org/presentationml/2006/main">
+  <p:cSld>
+    <p:spTree>
+      <p:nvGrpSpPr>
+        <p:cNvPr id="1" name=""/>
+        <p:cNvGrpSpPr/>
+        <p:nvPr/>
+      </p:nvGrpSpPr>
+      <p:grpSpPr>
+        <a:xfrm>
+          <a:off x="0" y="0"/>
+          <a:ext cx="0" cy="0"/>
+          <a:chOff x="0" y="0"/>
+          <a:chExt cx="0" cy="0"/>
+        </a:xfrm>
+      </p:grpSpPr>
+      <p:sp>
+        <p:nvSpPr>
+          <p:cNvPr id="2" name="Espace réservé de l'image des diapositives 1"/>
+          <p:cNvSpPr>
+            <a:spLocks noGrp="1" noRot="1" noChangeAspect="1"/>
+          </p:cNvSpPr>
+          <p:nvPr>
+            <p:ph type="sldImg"/>
+          </p:nvPr>
+        </p:nvSpPr>
+        <p:spPr/>
+      </p:sp>
+      <p:sp>
+        <p:nvSpPr>
+          <p:cNvPr id="3" name="Espace réservé des notes 2"/>
+          <p:cNvSpPr>
+            <a:spLocks noGrp="1"/>
+          </p:cNvSpPr>
+          <p:nvPr>
+            <p:ph type="body" idx="1"/>
+          </p:nvPr>
+        </p:nvSpPr>
+        <p:spPr/>
+        <p:txBody>
+          <a:bodyPr/>
+          <a:lstStyle/>
+          <a:p>
+            <a:r>
+              <a:rPr lang="fr-FR" dirty="0"/>
               <a:t>Les limitation technologique et les faibles connaissances informatiques de l’époque forçait les développeurs à rivaliser ingéniosité pour faire entrer tout le code dans l’ordinateur</a:t>
             </a:r>
           </a:p>
@@ -724,7 +824,7 @@
 </p:notes>
 </file>
 
-<file path=ppt/notesSlides/notesSlide4.xml><?xml version="1.0" encoding="utf-8"?>
+<file path=ppt/notesSlides/notesSlide5.xml><?xml version="1.0" encoding="utf-8"?>
 <p:notes xmlns:a="http://schemas.openxmlformats.org/drawingml/2006/main" xmlns:r="http://schemas.openxmlformats.org/officeDocument/2006/relationships" xmlns:p="http://schemas.openxmlformats.org/presentationml/2006/main">
   <p:cSld>
     <p:spTree>
@@ -982,7 +1082,7 @@
           <a:p>
             <a:fld id="{81D53455-E462-4A2D-AEF2-CC3F744B3D55}" type="datetimeFigureOut">
               <a:rPr lang="fr-FR" smtClean="0"/>
-              <a:t>20/06/2018</a:t>
+              <a:t>26/06/2018</a:t>
             </a:fld>
             <a:endParaRPr lang="fr-FR"/>
           </a:p>
@@ -1180,7 +1280,7 @@
           <a:p>
             <a:fld id="{81D53455-E462-4A2D-AEF2-CC3F744B3D55}" type="datetimeFigureOut">
               <a:rPr lang="fr-FR" smtClean="0"/>
-              <a:t>20/06/2018</a:t>
+              <a:t>26/06/2018</a:t>
             </a:fld>
             <a:endParaRPr lang="fr-FR"/>
           </a:p>
@@ -1388,7 +1488,7 @@
           <a:p>
             <a:fld id="{81D53455-E462-4A2D-AEF2-CC3F744B3D55}" type="datetimeFigureOut">
               <a:rPr lang="fr-FR" smtClean="0"/>
-              <a:t>20/06/2018</a:t>
+              <a:t>26/06/2018</a:t>
             </a:fld>
             <a:endParaRPr lang="fr-FR"/>
           </a:p>
@@ -1586,7 +1686,7 @@
           <a:p>
             <a:fld id="{81D53455-E462-4A2D-AEF2-CC3F744B3D55}" type="datetimeFigureOut">
               <a:rPr lang="fr-FR" smtClean="0"/>
-              <a:t>20/06/2018</a:t>
+              <a:t>26/06/2018</a:t>
             </a:fld>
             <a:endParaRPr lang="fr-FR"/>
           </a:p>
@@ -1861,7 +1961,7 @@
           <a:p>
             <a:fld id="{81D53455-E462-4A2D-AEF2-CC3F744B3D55}" type="datetimeFigureOut">
               <a:rPr lang="fr-FR" smtClean="0"/>
-              <a:t>20/06/2018</a:t>
+              <a:t>26/06/2018</a:t>
             </a:fld>
             <a:endParaRPr lang="fr-FR"/>
           </a:p>
@@ -2126,7 +2226,7 @@
           <a:p>
             <a:fld id="{81D53455-E462-4A2D-AEF2-CC3F744B3D55}" type="datetimeFigureOut">
               <a:rPr lang="fr-FR" smtClean="0"/>
-              <a:t>20/06/2018</a:t>
+              <a:t>26/06/2018</a:t>
             </a:fld>
             <a:endParaRPr lang="fr-FR"/>
           </a:p>
@@ -2538,7 +2638,7 @@
           <a:p>
             <a:fld id="{81D53455-E462-4A2D-AEF2-CC3F744B3D55}" type="datetimeFigureOut">
               <a:rPr lang="fr-FR" smtClean="0"/>
-              <a:t>20/06/2018</a:t>
+              <a:t>26/06/2018</a:t>
             </a:fld>
             <a:endParaRPr lang="fr-FR"/>
           </a:p>
@@ -2679,7 +2779,7 @@
           <a:p>
             <a:fld id="{81D53455-E462-4A2D-AEF2-CC3F744B3D55}" type="datetimeFigureOut">
               <a:rPr lang="fr-FR" smtClean="0"/>
-              <a:t>20/06/2018</a:t>
+              <a:t>26/06/2018</a:t>
             </a:fld>
             <a:endParaRPr lang="fr-FR"/>
           </a:p>
@@ -2792,7 +2892,7 @@
           <a:p>
             <a:fld id="{81D53455-E462-4A2D-AEF2-CC3F744B3D55}" type="datetimeFigureOut">
               <a:rPr lang="fr-FR" smtClean="0"/>
-              <a:t>20/06/2018</a:t>
+              <a:t>26/06/2018</a:t>
             </a:fld>
             <a:endParaRPr lang="fr-FR"/>
           </a:p>
@@ -3103,7 +3203,7 @@
           <a:p>
             <a:fld id="{81D53455-E462-4A2D-AEF2-CC3F744B3D55}" type="datetimeFigureOut">
               <a:rPr lang="fr-FR" smtClean="0"/>
-              <a:t>20/06/2018</a:t>
+              <a:t>26/06/2018</a:t>
             </a:fld>
             <a:endParaRPr lang="fr-FR"/>
           </a:p>
@@ -3391,7 +3491,7 @@
           <a:p>
             <a:fld id="{81D53455-E462-4A2D-AEF2-CC3F744B3D55}" type="datetimeFigureOut">
               <a:rPr lang="fr-FR" smtClean="0"/>
-              <a:t>20/06/2018</a:t>
+              <a:t>26/06/2018</a:t>
             </a:fld>
             <a:endParaRPr lang="fr-FR"/>
           </a:p>
@@ -3632,7 +3732,7 @@
           <a:p>
             <a:fld id="{81D53455-E462-4A2D-AEF2-CC3F744B3D55}" type="datetimeFigureOut">
               <a:rPr lang="fr-FR" smtClean="0"/>
-              <a:t>20/06/2018</a:t>
+              <a:t>26/06/2018</a:t>
             </a:fld>
             <a:endParaRPr lang="fr-FR"/>
           </a:p>
@@ -4303,7 +4403,7 @@
           </p:nvPr>
         </p:nvPicPr>
         <p:blipFill>
-          <a:blip r:embed="rId2">
+          <a:blip r:embed="rId3">
             <a:extLst>
               <a:ext uri="{28A0092B-C50C-407E-A947-70E740481C1C}">
                 <a14:useLocalDpi xmlns:a14="http://schemas.microsoft.com/office/drawing/2010/main" val="0"/>

</xml_diff>